<commit_message>
most docs done...need to proof
</commit_message>
<xml_diff>
--- a/docs/RaftLevels.pptx
+++ b/docs/RaftLevels.pptx
@@ -262,7 +262,7 @@
           <a:p>
             <a:fld id="{30AE3FC9-4016-3844-A90A-257C333061AB}" type="datetimeFigureOut">
               <a:rPr lang="en-US" smtClean="0"/>
-              <a:t>4/26/18</a:t>
+              <a:t>4/29/18</a:t>
             </a:fld>
             <a:endParaRPr lang="en-US"/>
           </a:p>
@@ -460,7 +460,7 @@
           <a:p>
             <a:fld id="{30AE3FC9-4016-3844-A90A-257C333061AB}" type="datetimeFigureOut">
               <a:rPr lang="en-US" smtClean="0"/>
-              <a:t>4/26/18</a:t>
+              <a:t>4/29/18</a:t>
             </a:fld>
             <a:endParaRPr lang="en-US"/>
           </a:p>
@@ -668,7 +668,7 @@
           <a:p>
             <a:fld id="{30AE3FC9-4016-3844-A90A-257C333061AB}" type="datetimeFigureOut">
               <a:rPr lang="en-US" smtClean="0"/>
-              <a:t>4/26/18</a:t>
+              <a:t>4/29/18</a:t>
             </a:fld>
             <a:endParaRPr lang="en-US"/>
           </a:p>
@@ -866,7 +866,7 @@
           <a:p>
             <a:fld id="{30AE3FC9-4016-3844-A90A-257C333061AB}" type="datetimeFigureOut">
               <a:rPr lang="en-US" smtClean="0"/>
-              <a:t>4/26/18</a:t>
+              <a:t>4/29/18</a:t>
             </a:fld>
             <a:endParaRPr lang="en-US"/>
           </a:p>
@@ -1141,7 +1141,7 @@
           <a:p>
             <a:fld id="{30AE3FC9-4016-3844-A90A-257C333061AB}" type="datetimeFigureOut">
               <a:rPr lang="en-US" smtClean="0"/>
-              <a:t>4/26/18</a:t>
+              <a:t>4/29/18</a:t>
             </a:fld>
             <a:endParaRPr lang="en-US"/>
           </a:p>
@@ -1406,7 +1406,7 @@
           <a:p>
             <a:fld id="{30AE3FC9-4016-3844-A90A-257C333061AB}" type="datetimeFigureOut">
               <a:rPr lang="en-US" smtClean="0"/>
-              <a:t>4/26/18</a:t>
+              <a:t>4/29/18</a:t>
             </a:fld>
             <a:endParaRPr lang="en-US"/>
           </a:p>
@@ -1818,7 +1818,7 @@
           <a:p>
             <a:fld id="{30AE3FC9-4016-3844-A90A-257C333061AB}" type="datetimeFigureOut">
               <a:rPr lang="en-US" smtClean="0"/>
-              <a:t>4/26/18</a:t>
+              <a:t>4/29/18</a:t>
             </a:fld>
             <a:endParaRPr lang="en-US"/>
           </a:p>
@@ -1959,7 +1959,7 @@
           <a:p>
             <a:fld id="{30AE3FC9-4016-3844-A90A-257C333061AB}" type="datetimeFigureOut">
               <a:rPr lang="en-US" smtClean="0"/>
-              <a:t>4/26/18</a:t>
+              <a:t>4/29/18</a:t>
             </a:fld>
             <a:endParaRPr lang="en-US"/>
           </a:p>
@@ -2072,7 +2072,7 @@
           <a:p>
             <a:fld id="{30AE3FC9-4016-3844-A90A-257C333061AB}" type="datetimeFigureOut">
               <a:rPr lang="en-US" smtClean="0"/>
-              <a:t>4/26/18</a:t>
+              <a:t>4/29/18</a:t>
             </a:fld>
             <a:endParaRPr lang="en-US"/>
           </a:p>
@@ -2383,7 +2383,7 @@
           <a:p>
             <a:fld id="{30AE3FC9-4016-3844-A90A-257C333061AB}" type="datetimeFigureOut">
               <a:rPr lang="en-US" smtClean="0"/>
-              <a:t>4/26/18</a:t>
+              <a:t>4/29/18</a:t>
             </a:fld>
             <a:endParaRPr lang="en-US"/>
           </a:p>
@@ -2671,7 +2671,7 @@
           <a:p>
             <a:fld id="{30AE3FC9-4016-3844-A90A-257C333061AB}" type="datetimeFigureOut">
               <a:rPr lang="en-US" smtClean="0"/>
-              <a:t>4/26/18</a:t>
+              <a:t>4/29/18</a:t>
             </a:fld>
             <a:endParaRPr lang="en-US"/>
           </a:p>
@@ -2912,7 +2912,7 @@
           <a:p>
             <a:fld id="{30AE3FC9-4016-3844-A90A-257C333061AB}" type="datetimeFigureOut">
               <a:rPr lang="en-US" smtClean="0"/>
-              <a:t>4/26/18</a:t>
+              <a:t>4/29/18</a:t>
             </a:fld>
             <a:endParaRPr lang="en-US"/>
           </a:p>
@@ -10940,31 +10940,6 @@
           <a:chExt cx="0" cy="0"/>
         </a:xfrm>
       </p:grpSpPr>
-      <p:sp>
-        <p:nvSpPr>
-          <p:cNvPr id="2" name="Title 1">
-            <a:extLst>
-              <a:ext uri="{FF2B5EF4-FFF2-40B4-BE49-F238E27FC236}">
-                <a16:creationId xmlns:a16="http://schemas.microsoft.com/office/drawing/2014/main" id="{8568CC4A-6B40-2048-8976-09713CEC5888}"/>
-              </a:ext>
-            </a:extLst>
-          </p:cNvPr>
-          <p:cNvSpPr>
-            <a:spLocks noGrp="1"/>
-          </p:cNvSpPr>
-          <p:nvPr>
-            <p:ph type="title"/>
-          </p:nvPr>
-        </p:nvSpPr>
-        <p:spPr/>
-        <p:txBody>
-          <a:bodyPr/>
-          <a:lstStyle/>
-          <a:p>
-            <a:endParaRPr lang="en-US"/>
-          </a:p>
-        </p:txBody>
-      </p:sp>
       <p:grpSp>
         <p:nvGrpSpPr>
           <p:cNvPr id="4" name="Group 3">
@@ -10979,10 +10954,10 @@
         </p:nvGrpSpPr>
         <p:grpSpPr>
           <a:xfrm>
-            <a:off x="1194260" y="2764729"/>
-            <a:ext cx="3460375" cy="2737626"/>
+            <a:off x="1194260" y="74423"/>
+            <a:ext cx="8675444" cy="6549659"/>
             <a:chOff x="1577883" y="-276912"/>
-            <a:chExt cx="3460375" cy="2737626"/>
+            <a:chExt cx="3448764" cy="2737626"/>
           </a:xfrm>
         </p:grpSpPr>
         <p:sp>
@@ -11035,7 +11010,7 @@
             <a:lstStyle/>
             <a:p>
               <a:pPr algn="ctr"/>
-              <a:endParaRPr lang="en-US">
+              <a:endParaRPr lang="en-US" sz="4000">
                 <a:latin typeface="Helvetica" pitchFamily="2" charset="0"/>
               </a:endParaRPr>
             </a:p>
@@ -11091,7 +11066,7 @@
             <a:lstStyle/>
             <a:p>
               <a:pPr algn="ctr"/>
-              <a:endParaRPr lang="en-US">
+              <a:endParaRPr lang="en-US" sz="4000">
                 <a:latin typeface="Helvetica" pitchFamily="2" charset="0"/>
               </a:endParaRPr>
             </a:p>
@@ -11147,7 +11122,7 @@
             <a:lstStyle/>
             <a:p>
               <a:pPr algn="ctr"/>
-              <a:endParaRPr lang="en-US">
+              <a:endParaRPr lang="en-US" sz="4000">
                 <a:latin typeface="Helvetica" pitchFamily="2" charset="0"/>
               </a:endParaRPr>
             </a:p>
@@ -11203,7 +11178,7 @@
             <a:lstStyle/>
             <a:p>
               <a:pPr algn="ctr"/>
-              <a:endParaRPr lang="en-US" dirty="0">
+              <a:endParaRPr lang="en-US" sz="4000" dirty="0">
                 <a:latin typeface="Helvetica" pitchFamily="2" charset="0"/>
               </a:endParaRPr>
             </a:p>
@@ -11259,7 +11234,7 @@
             <a:lstStyle/>
             <a:p>
               <a:pPr algn="ctr"/>
-              <a:endParaRPr lang="en-US">
+              <a:endParaRPr lang="en-US" sz="4000">
                 <a:latin typeface="Helvetica" pitchFamily="2" charset="0"/>
               </a:endParaRPr>
             </a:p>
@@ -11315,7 +11290,7 @@
             <a:lstStyle/>
             <a:p>
               <a:pPr algn="ctr"/>
-              <a:endParaRPr lang="en-US">
+              <a:endParaRPr lang="en-US" sz="4000">
                 <a:latin typeface="Helvetica" pitchFamily="2" charset="0"/>
               </a:endParaRPr>
             </a:p>
@@ -11371,7 +11346,7 @@
             <a:lstStyle/>
             <a:p>
               <a:pPr algn="ctr"/>
-              <a:endParaRPr lang="en-US">
+              <a:endParaRPr lang="en-US" sz="4000">
                 <a:latin typeface="Helvetica" pitchFamily="2" charset="0"/>
               </a:endParaRPr>
             </a:p>
@@ -11427,7 +11402,7 @@
             <a:lstStyle/>
             <a:p>
               <a:pPr algn="ctr"/>
-              <a:endParaRPr lang="en-US">
+              <a:endParaRPr lang="en-US" sz="4000">
                 <a:latin typeface="Helvetica" pitchFamily="2" charset="0"/>
               </a:endParaRPr>
             </a:p>
@@ -11483,7 +11458,7 @@
             <a:lstStyle/>
             <a:p>
               <a:pPr algn="ctr"/>
-              <a:endParaRPr lang="en-US">
+              <a:endParaRPr lang="en-US" sz="4000">
                 <a:latin typeface="Helvetica" pitchFamily="2" charset="0"/>
               </a:endParaRPr>
             </a:p>
@@ -11539,7 +11514,7 @@
             <a:lstStyle/>
             <a:p>
               <a:pPr algn="ctr"/>
-              <a:endParaRPr lang="en-US" dirty="0">
+              <a:endParaRPr lang="en-US" sz="4000" dirty="0">
                 <a:latin typeface="Helvetica" pitchFamily="2" charset="0"/>
               </a:endParaRPr>
             </a:p>
@@ -11646,7 +11621,7 @@
             <a:p>
               <a:pPr algn="ctr"/>
               <a:r>
-                <a:rPr lang="en-US" sz="1000" dirty="0">
+                <a:rPr lang="en-US" sz="2000" b="1" dirty="0">
                   <a:latin typeface="Helvetica" pitchFamily="2" charset="0"/>
                 </a:rPr>
                 <a:t>Follower</a:t>
@@ -11709,7 +11684,7 @@
             <a:p>
               <a:pPr algn="ctr"/>
               <a:r>
-                <a:rPr lang="en-US" sz="1000" dirty="0">
+                <a:rPr lang="en-US" sz="2000" b="1" dirty="0">
                   <a:latin typeface="Helvetica" pitchFamily="2" charset="0"/>
                 </a:rPr>
                 <a:t>Candidate</a:t>
@@ -11770,7 +11745,7 @@
             <a:p>
               <a:pPr algn="ctr"/>
               <a:r>
-                <a:rPr lang="en-US" sz="1000" dirty="0">
+                <a:rPr lang="en-US" sz="2000" b="1" dirty="0">
                   <a:latin typeface="Helvetica" pitchFamily="2" charset="0"/>
                 </a:rPr>
                 <a:t>Relay</a:t>
@@ -11831,7 +11806,7 @@
             <a:p>
               <a:pPr algn="ctr"/>
               <a:r>
-                <a:rPr lang="en-US" sz="1000" dirty="0">
+                <a:rPr lang="en-US" sz="2000" b="1" dirty="0">
                   <a:latin typeface="Helvetica" pitchFamily="2" charset="0"/>
                 </a:rPr>
                 <a:t>Leader</a:t>
@@ -11894,7 +11869,7 @@
             <a:p>
               <a:pPr algn="ctr"/>
               <a:r>
-                <a:rPr lang="en-US" sz="1000" dirty="0">
+                <a:rPr lang="en-US" sz="2000" b="1" dirty="0">
                   <a:latin typeface="Helvetica" pitchFamily="2" charset="0"/>
                 </a:rPr>
                 <a:t>Candidate</a:t>
@@ -11917,7 +11892,7 @@
           <p:spPr>
             <a:xfrm>
               <a:off x="1783080" y="1049020"/>
-              <a:ext cx="443609" cy="215444"/>
+              <a:ext cx="443609" cy="154373"/>
             </a:xfrm>
             <a:prstGeom prst="rect">
               <a:avLst/>
@@ -11931,7 +11906,7 @@
             <a:lstStyle/>
             <a:p>
               <a:r>
-                <a:rPr lang="en-US" sz="800" dirty="0">
+                <a:rPr lang="en-US" dirty="0">
                   <a:latin typeface="Helvetica" pitchFamily="2" charset="0"/>
                   <a:cs typeface="Times New Roman" panose="02020603050405020304" pitchFamily="18" charset="0"/>
                 </a:rPr>
@@ -11954,8 +11929,8 @@
           </p:nvSpPr>
           <p:spPr>
             <a:xfrm>
-              <a:off x="2144910" y="745224"/>
-              <a:ext cx="613951" cy="246221"/>
+              <a:off x="2179144" y="745224"/>
+              <a:ext cx="545482" cy="231560"/>
             </a:xfrm>
             <a:prstGeom prst="rect">
               <a:avLst/>
@@ -11970,7 +11945,7 @@
             <a:p>
               <a:pPr algn="ctr"/>
               <a:r>
-                <a:rPr lang="en-US" sz="800" dirty="0">
+                <a:rPr lang="en-US" dirty="0">
                   <a:latin typeface="Helvetica" pitchFamily="2" charset="0"/>
                   <a:cs typeface="Times New Roman" panose="02020603050405020304" pitchFamily="18" charset="0"/>
                 </a:rPr>
@@ -11980,7 +11955,7 @@
             <a:p>
               <a:pPr algn="ctr"/>
               <a:r>
-                <a:rPr lang="en-US" sz="800" dirty="0">
+                <a:rPr lang="en-US" dirty="0">
                   <a:latin typeface="Helvetica" pitchFamily="2" charset="0"/>
                   <a:cs typeface="Times New Roman" panose="02020603050405020304" pitchFamily="18" charset="0"/>
                 </a:rPr>
@@ -12003,8 +11978,8 @@
           </p:nvSpPr>
           <p:spPr>
             <a:xfrm>
-              <a:off x="2679071" y="440907"/>
-              <a:ext cx="573876" cy="246221"/>
+              <a:off x="2743151" y="440907"/>
+              <a:ext cx="509795" cy="231560"/>
             </a:xfrm>
             <a:prstGeom prst="rect">
               <a:avLst/>
@@ -12019,7 +11994,7 @@
             <a:p>
               <a:pPr algn="r"/>
               <a:r>
-                <a:rPr lang="en-US" sz="800" dirty="0">
+                <a:rPr lang="en-US" dirty="0">
                   <a:latin typeface="Helvetica" pitchFamily="2" charset="0"/>
                   <a:cs typeface="Times New Roman" panose="02020603050405020304" pitchFamily="18" charset="0"/>
                 </a:rPr>
@@ -12029,7 +12004,7 @@
             <a:p>
               <a:pPr algn="ctr"/>
               <a:r>
-                <a:rPr lang="en-US" sz="800" dirty="0">
+                <a:rPr lang="en-US" dirty="0">
                   <a:latin typeface="Helvetica" pitchFamily="2" charset="0"/>
                   <a:cs typeface="Times New Roman" panose="02020603050405020304" pitchFamily="18" charset="0"/>
                 </a:rPr>
@@ -12052,8 +12027,8 @@
           </p:nvSpPr>
           <p:spPr>
             <a:xfrm>
-              <a:off x="3950954" y="783320"/>
-              <a:ext cx="817533" cy="123111"/>
+              <a:off x="3995216" y="783320"/>
+              <a:ext cx="729008" cy="115780"/>
             </a:xfrm>
             <a:prstGeom prst="rect">
               <a:avLst/>
@@ -12068,7 +12043,7 @@
             <a:p>
               <a:pPr algn="ctr"/>
               <a:r>
-                <a:rPr lang="en-US" sz="800" dirty="0">
+                <a:rPr lang="en-US" dirty="0">
                   <a:latin typeface="Helvetica" pitchFamily="2" charset="0"/>
                   <a:cs typeface="Times New Roman" panose="02020603050405020304" pitchFamily="18" charset="0"/>
                 </a:rPr>
@@ -12091,8 +12066,8 @@
           </p:nvSpPr>
           <p:spPr>
             <a:xfrm>
-              <a:off x="4344552" y="2189927"/>
-              <a:ext cx="573875" cy="246221"/>
+              <a:off x="4376593" y="2189927"/>
+              <a:ext cx="509795" cy="231560"/>
             </a:xfrm>
             <a:prstGeom prst="rect">
               <a:avLst/>
@@ -12107,7 +12082,7 @@
             <a:p>
               <a:pPr algn="ctr"/>
               <a:r>
-                <a:rPr lang="en-US" sz="800" dirty="0">
+                <a:rPr lang="en-US" dirty="0">
                   <a:latin typeface="Helvetica" pitchFamily="2" charset="0"/>
                   <a:cs typeface="Times New Roman" panose="02020603050405020304" pitchFamily="18" charset="0"/>
                 </a:rPr>
@@ -12117,7 +12092,7 @@
             <a:p>
               <a:pPr algn="ctr"/>
               <a:r>
-                <a:rPr lang="en-US" sz="800" dirty="0">
+                <a:rPr lang="en-US" dirty="0">
                   <a:latin typeface="Helvetica" pitchFamily="2" charset="0"/>
                   <a:cs typeface="Times New Roman" panose="02020603050405020304" pitchFamily="18" charset="0"/>
                 </a:rPr>
@@ -12140,8 +12115,8 @@
           </p:nvSpPr>
           <p:spPr>
             <a:xfrm>
-              <a:off x="4424307" y="1731924"/>
-              <a:ext cx="613951" cy="246221"/>
+              <a:off x="4458541" y="1731924"/>
+              <a:ext cx="545482" cy="231560"/>
             </a:xfrm>
             <a:prstGeom prst="rect">
               <a:avLst/>
@@ -12156,7 +12131,7 @@
             <a:p>
               <a:pPr algn="ctr"/>
               <a:r>
-                <a:rPr lang="en-US" sz="800" dirty="0">
+                <a:rPr lang="en-US" dirty="0">
                   <a:latin typeface="Helvetica" pitchFamily="2" charset="0"/>
                   <a:cs typeface="Times New Roman" panose="02020603050405020304" pitchFamily="18" charset="0"/>
                 </a:rPr>
@@ -12166,7 +12141,7 @@
             <a:p>
               <a:pPr algn="ctr"/>
               <a:r>
-                <a:rPr lang="en-US" sz="800" dirty="0">
+                <a:rPr lang="en-US" dirty="0">
                   <a:latin typeface="Helvetica" pitchFamily="2" charset="0"/>
                   <a:cs typeface="Times New Roman" panose="02020603050405020304" pitchFamily="18" charset="0"/>
                 </a:rPr>
@@ -12189,8 +12164,8 @@
           </p:nvSpPr>
           <p:spPr>
             <a:xfrm>
-              <a:off x="2946231" y="1284837"/>
-              <a:ext cx="1008289" cy="246221"/>
+              <a:off x="3124106" y="1284837"/>
+              <a:ext cx="652538" cy="231560"/>
             </a:xfrm>
             <a:prstGeom prst="rect">
               <a:avLst/>
@@ -12205,17 +12180,17 @@
             <a:p>
               <a:pPr algn="ctr"/>
               <a:r>
-                <a:rPr lang="en-US" sz="800" dirty="0">
+                <a:rPr lang="en-US" dirty="0">
                   <a:latin typeface="Helvetica" pitchFamily="2" charset="0"/>
                   <a:cs typeface="Times New Roman" panose="02020603050405020304" pitchFamily="18" charset="0"/>
                 </a:rPr>
-                <a:t>discovers coordinator </a:t>
+                <a:t>discovers relay </a:t>
               </a:r>
             </a:p>
             <a:p>
               <a:pPr algn="ctr"/>
               <a:r>
-                <a:rPr lang="en-US" sz="800" dirty="0">
+                <a:rPr lang="en-US" dirty="0">
                   <a:latin typeface="Helvetica" pitchFamily="2" charset="0"/>
                   <a:cs typeface="Times New Roman" panose="02020603050405020304" pitchFamily="18" charset="0"/>
                 </a:rPr>
@@ -12238,8 +12213,8 @@
           </p:nvSpPr>
           <p:spPr>
             <a:xfrm>
-              <a:off x="3069237" y="2201268"/>
-              <a:ext cx="817531" cy="123111"/>
+              <a:off x="3113499" y="2201268"/>
+              <a:ext cx="729008" cy="115780"/>
             </a:xfrm>
             <a:prstGeom prst="rect">
               <a:avLst/>
@@ -12254,7 +12229,7 @@
             <a:p>
               <a:pPr algn="ctr"/>
               <a:r>
-                <a:rPr lang="en-US" sz="800" dirty="0">
+                <a:rPr lang="en-US" dirty="0">
                   <a:latin typeface="Helvetica" pitchFamily="2" charset="0"/>
                   <a:cs typeface="Times New Roman" panose="02020603050405020304" pitchFamily="18" charset="0"/>
                 </a:rPr>
@@ -12277,8 +12252,8 @@
           </p:nvSpPr>
           <p:spPr>
             <a:xfrm>
-              <a:off x="1999731" y="1676926"/>
-              <a:ext cx="527388" cy="369332"/>
+              <a:off x="2028920" y="1676926"/>
+              <a:ext cx="469012" cy="347340"/>
             </a:xfrm>
             <a:prstGeom prst="rect">
               <a:avLst/>
@@ -12293,7 +12268,7 @@
             <a:p>
               <a:pPr algn="ctr"/>
               <a:r>
-                <a:rPr lang="en-US" sz="800" dirty="0">
+                <a:rPr lang="en-US" dirty="0">
                   <a:latin typeface="Helvetica" pitchFamily="2" charset="0"/>
                   <a:cs typeface="Times New Roman" panose="02020603050405020304" pitchFamily="18" charset="0"/>
                 </a:rPr>
@@ -12303,7 +12278,7 @@
             <a:p>
               <a:pPr algn="ctr"/>
               <a:r>
-                <a:rPr lang="en-US" sz="800" dirty="0">
+                <a:rPr lang="en-US" dirty="0">
                   <a:latin typeface="Helvetica" pitchFamily="2" charset="0"/>
                   <a:cs typeface="Times New Roman" panose="02020603050405020304" pitchFamily="18" charset="0"/>
                 </a:rPr>
@@ -12313,7 +12288,7 @@
             <a:p>
               <a:pPr algn="ctr"/>
               <a:r>
-                <a:rPr lang="en-US" sz="800" dirty="0">
+                <a:rPr lang="en-US" dirty="0">
                   <a:latin typeface="Helvetica" pitchFamily="2" charset="0"/>
                   <a:cs typeface="Times New Roman" panose="02020603050405020304" pitchFamily="18" charset="0"/>
                 </a:rPr>
@@ -12336,8 +12311,8 @@
           </p:nvSpPr>
           <p:spPr>
             <a:xfrm>
-              <a:off x="3168495" y="1083405"/>
-              <a:ext cx="625172" cy="123111"/>
+              <a:off x="3203243" y="1083405"/>
+              <a:ext cx="555677" cy="115780"/>
             </a:xfrm>
             <a:prstGeom prst="rect">
               <a:avLst/>
@@ -12352,7 +12327,7 @@
             <a:p>
               <a:pPr algn="ctr"/>
               <a:r>
-                <a:rPr lang="en-US" sz="800" dirty="0">
+                <a:rPr lang="en-US" dirty="0">
                   <a:latin typeface="Helvetica" pitchFamily="2" charset="0"/>
                   <a:cs typeface="Times New Roman" panose="02020603050405020304" pitchFamily="18" charset="0"/>
                 </a:rPr>
@@ -12375,8 +12350,8 @@
           </p:nvSpPr>
           <p:spPr>
             <a:xfrm>
-              <a:off x="3486157" y="1613573"/>
-              <a:ext cx="355867" cy="246221"/>
+              <a:off x="3596685" y="1613573"/>
+              <a:ext cx="245339" cy="240396"/>
             </a:xfrm>
             <a:prstGeom prst="rect">
               <a:avLst/>
@@ -12391,7 +12366,7 @@
             <a:p>
               <a:pPr algn="r"/>
               <a:r>
-                <a:rPr lang="en-US" sz="800" dirty="0">
+                <a:rPr lang="en-US" sz="1400" dirty="0">
                   <a:latin typeface="Helvetica" pitchFamily="2" charset="0"/>
                   <a:cs typeface="Times New Roman" panose="02020603050405020304" pitchFamily="18" charset="0"/>
                 </a:rPr>
@@ -12401,7 +12376,7 @@
             <a:p>
               <a:pPr algn="ctr"/>
               <a:r>
-                <a:rPr lang="en-US" sz="800" dirty="0">
+                <a:rPr lang="en-US" sz="1400" dirty="0">
                   <a:latin typeface="Helvetica" pitchFamily="2" charset="0"/>
                   <a:cs typeface="Times New Roman" panose="02020603050405020304" pitchFamily="18" charset="0"/>
                 </a:rPr>
@@ -12411,6 +12386,36 @@
           </p:txBody>
         </p:sp>
       </p:grpSp>
+      <p:sp>
+        <p:nvSpPr>
+          <p:cNvPr id="32" name="Title 1">
+            <a:extLst>
+              <a:ext uri="{FF2B5EF4-FFF2-40B4-BE49-F238E27FC236}">
+                <a16:creationId xmlns:a16="http://schemas.microsoft.com/office/drawing/2014/main" id="{DEB2389E-011F-D846-A7A9-10DA1092AD51}"/>
+              </a:ext>
+            </a:extLst>
+          </p:cNvPr>
+          <p:cNvSpPr>
+            <a:spLocks noGrp="1"/>
+          </p:cNvSpPr>
+          <p:nvPr>
+            <p:ph type="title"/>
+          </p:nvPr>
+        </p:nvSpPr>
+        <p:spPr/>
+        <p:txBody>
+          <a:bodyPr/>
+          <a:lstStyle/>
+          <a:p>
+            <a:r>
+              <a:rPr lang="en-US" dirty="0">
+                <a:latin typeface="Helvetica" pitchFamily="2" charset="0"/>
+              </a:rPr>
+              <a:t>Node state lifecycle in multi-layer raft</a:t>
+            </a:r>
+          </a:p>
+        </p:txBody>
+      </p:sp>
     </p:spTree>
     <p:extLst>
       <p:ext uri="{BB962C8B-B14F-4D97-AF65-F5344CB8AC3E}">

</xml_diff>